<commit_message>
Slides - Day 3
</commit_message>
<xml_diff>
--- a/slides/Node Slides Day 3.pptx
+++ b/slides/Node Slides Day 3.pptx
@@ -8,10 +8,10 @@
     <p:sldId id="256" r:id="rId2"/>
     <p:sldId id="257" r:id="rId3"/>
     <p:sldId id="296" r:id="rId4"/>
-    <p:sldId id="303" r:id="rId5"/>
-    <p:sldId id="304" r:id="rId6"/>
-    <p:sldId id="305" r:id="rId7"/>
-    <p:sldId id="306" r:id="rId8"/>
+    <p:sldId id="308" r:id="rId5"/>
+    <p:sldId id="303" r:id="rId6"/>
+    <p:sldId id="310" r:id="rId7"/>
+    <p:sldId id="309" r:id="rId8"/>
   </p:sldIdLst>
   <p:sldSz cx="9144000" cy="6858000" type="screen4x3"/>
   <p:notesSz cx="6858000" cy="9144000"/>
@@ -294,7 +294,7 @@
           <a:p>
             <a:fld id="{6BFECD78-3C8E-49F2-8FAB-59489D168ABB}" type="datetimeFigureOut">
               <a:rPr lang="en-US" smtClean="0"/>
-              <a:t>11/15/16</a:t>
+              <a:t>11/17/16</a:t>
             </a:fld>
             <a:endParaRPr lang="en-US"/>
           </a:p>
@@ -464,7 +464,7 @@
           <a:p>
             <a:fld id="{6BFECD78-3C8E-49F2-8FAB-59489D168ABB}" type="datetimeFigureOut">
               <a:rPr lang="en-US" smtClean="0"/>
-              <a:t>11/15/16</a:t>
+              <a:t>11/17/16</a:t>
             </a:fld>
             <a:endParaRPr lang="en-US"/>
           </a:p>
@@ -644,7 +644,7 @@
           <a:p>
             <a:fld id="{6BFECD78-3C8E-49F2-8FAB-59489D168ABB}" type="datetimeFigureOut">
               <a:rPr lang="en-US" smtClean="0"/>
-              <a:t>11/15/16</a:t>
+              <a:t>11/17/16</a:t>
             </a:fld>
             <a:endParaRPr lang="en-US"/>
           </a:p>
@@ -814,7 +814,7 @@
           <a:p>
             <a:fld id="{6BFECD78-3C8E-49F2-8FAB-59489D168ABB}" type="datetimeFigureOut">
               <a:rPr lang="en-US" smtClean="0"/>
-              <a:t>11/15/16</a:t>
+              <a:t>11/17/16</a:t>
             </a:fld>
             <a:endParaRPr lang="en-US"/>
           </a:p>
@@ -1060,7 +1060,7 @@
           <a:p>
             <a:fld id="{6BFECD78-3C8E-49F2-8FAB-59489D168ABB}" type="datetimeFigureOut">
               <a:rPr lang="en-US" smtClean="0"/>
-              <a:t>11/15/16</a:t>
+              <a:t>11/17/16</a:t>
             </a:fld>
             <a:endParaRPr lang="en-US"/>
           </a:p>
@@ -1348,7 +1348,7 @@
           <a:p>
             <a:fld id="{6BFECD78-3C8E-49F2-8FAB-59489D168ABB}" type="datetimeFigureOut">
               <a:rPr lang="en-US" smtClean="0"/>
-              <a:t>11/15/16</a:t>
+              <a:t>11/17/16</a:t>
             </a:fld>
             <a:endParaRPr lang="en-US"/>
           </a:p>
@@ -1770,7 +1770,7 @@
           <a:p>
             <a:fld id="{6BFECD78-3C8E-49F2-8FAB-59489D168ABB}" type="datetimeFigureOut">
               <a:rPr lang="en-US" smtClean="0"/>
-              <a:t>11/15/16</a:t>
+              <a:t>11/17/16</a:t>
             </a:fld>
             <a:endParaRPr lang="en-US"/>
           </a:p>
@@ -1888,7 +1888,7 @@
           <a:p>
             <a:fld id="{6BFECD78-3C8E-49F2-8FAB-59489D168ABB}" type="datetimeFigureOut">
               <a:rPr lang="en-US" smtClean="0"/>
-              <a:t>11/15/16</a:t>
+              <a:t>11/17/16</a:t>
             </a:fld>
             <a:endParaRPr lang="en-US"/>
           </a:p>
@@ -1983,7 +1983,7 @@
           <a:p>
             <a:fld id="{6BFECD78-3C8E-49F2-8FAB-59489D168ABB}" type="datetimeFigureOut">
               <a:rPr lang="en-US" smtClean="0"/>
-              <a:t>11/15/16</a:t>
+              <a:t>11/17/16</a:t>
             </a:fld>
             <a:endParaRPr lang="en-US"/>
           </a:p>
@@ -2260,7 +2260,7 @@
           <a:p>
             <a:fld id="{6BFECD78-3C8E-49F2-8FAB-59489D168ABB}" type="datetimeFigureOut">
               <a:rPr lang="en-US" smtClean="0"/>
-              <a:t>11/15/16</a:t>
+              <a:t>11/17/16</a:t>
             </a:fld>
             <a:endParaRPr lang="en-US"/>
           </a:p>
@@ -2517,7 +2517,7 @@
           <a:p>
             <a:fld id="{6BFECD78-3C8E-49F2-8FAB-59489D168ABB}" type="datetimeFigureOut">
               <a:rPr lang="en-US" smtClean="0"/>
-              <a:t>11/15/16</a:t>
+              <a:t>11/17/16</a:t>
             </a:fld>
             <a:endParaRPr lang="en-US"/>
           </a:p>
@@ -2730,7 +2730,7 @@
           <a:p>
             <a:fld id="{6BFECD78-3C8E-49F2-8FAB-59489D168ABB}" type="datetimeFigureOut">
               <a:rPr lang="en-US" smtClean="0"/>
-              <a:t>11/15/16</a:t>
+              <a:t>11/17/16</a:t>
             </a:fld>
             <a:endParaRPr lang="en-US"/>
           </a:p>
@@ -3262,7 +3262,7 @@
         </p:spPr>
         <p:txBody>
           <a:bodyPr>
-            <a:normAutofit lnSpcReduction="10000"/>
+            <a:normAutofit/>
           </a:bodyPr>
           <a:lstStyle/>
           <a:p>
@@ -3279,19 +3279,7 @@
             </a:pPr>
             <a:r>
               <a:rPr lang="en-US" dirty="0"/>
-              <a:t>Web, REST &amp; </a:t>
-            </a:r>
-            <a:r>
-              <a:rPr lang="en-US" dirty="0" err="1"/>
-              <a:t>GraphQL</a:t>
-            </a:r>
-            <a:r>
-              <a:rPr lang="en-US" dirty="0"/>
-              <a:t> </a:t>
-            </a:r>
-            <a:r>
-              <a:rPr lang="en-US" dirty="0" smtClean="0"/>
-              <a:t>Services</a:t>
+              <a:t>Express</a:t>
             </a:r>
           </a:p>
           <a:p>
@@ -3301,8 +3289,17 @@
             </a:pPr>
             <a:r>
               <a:rPr lang="en-US" dirty="0" smtClean="0"/>
-              <a:t>Express</a:t>
-            </a:r>
+              <a:t>Authentication </a:t>
+            </a:r>
+            <a:r>
+              <a:rPr lang="en-US" dirty="0" smtClean="0"/>
+              <a:t>/ </a:t>
+            </a:r>
+            <a:r>
+              <a:rPr lang="en-US" dirty="0" err="1" smtClean="0"/>
+              <a:t>Oauth</a:t>
+            </a:r>
+            <a:endParaRPr lang="en-US" dirty="0" smtClean="0"/>
           </a:p>
           <a:p>
             <a:pPr marL="914400" lvl="1" indent="-457200" algn="l">
@@ -3311,13 +3308,8 @@
             </a:pPr>
             <a:r>
               <a:rPr lang="en-US" dirty="0" smtClean="0"/>
-              <a:t>Authentication / </a:t>
-            </a:r>
-            <a:r>
-              <a:rPr lang="en-US" dirty="0" err="1" smtClean="0"/>
-              <a:t>Oauth</a:t>
-            </a:r>
-            <a:endParaRPr lang="en-US" dirty="0" smtClean="0"/>
+              <a:t>Cookies / Sessions</a:t>
+            </a:r>
           </a:p>
           <a:p>
             <a:pPr marL="914400" lvl="1" indent="-457200" algn="l">
@@ -3326,17 +3318,7 @@
             </a:pPr>
             <a:r>
               <a:rPr lang="en-US" dirty="0" smtClean="0"/>
-              <a:t>Cookies / Sessions</a:t>
-            </a:r>
-          </a:p>
-          <a:p>
-            <a:pPr marL="914400" lvl="1" indent="-457200" algn="l">
-              <a:buFont typeface="Arial"/>
-              <a:buChar char="•"/>
-            </a:pPr>
-            <a:r>
-              <a:rPr lang="en-US" dirty="0" err="1" smtClean="0"/>
-              <a:t>GraphQL</a:t>
+              <a:t>REST</a:t>
             </a:r>
             <a:endParaRPr lang="en-US" dirty="0"/>
           </a:p>
@@ -3349,6 +3331,7 @@
               <a:rPr lang="en-US" dirty="0" smtClean="0"/>
               <a:t>Lunch</a:t>
             </a:r>
+            <a:endParaRPr lang="en-US" dirty="0" smtClean="0"/>
           </a:p>
           <a:p>
             <a:pPr marL="457200" indent="-457200" algn="l">
@@ -3458,19 +3441,49 @@
         </p:spPr>
         <p:txBody>
           <a:bodyPr>
-            <a:normAutofit fontScale="85000" lnSpcReduction="20000"/>
+            <a:normAutofit/>
           </a:bodyPr>
           <a:lstStyle/>
+          <a:p>
+            <a:pPr algn="l"/>
+            <a:r>
+              <a:rPr lang="en-US" dirty="0" smtClean="0"/>
+              <a:t>Express === Framework </a:t>
+            </a:r>
+            <a:endParaRPr lang="en-US" dirty="0" smtClean="0"/>
+          </a:p>
           <a:p>
             <a:pPr marL="457200" indent="-457200" algn="l">
               <a:buFont typeface="Arial"/>
               <a:buChar char="•"/>
             </a:pPr>
             <a:r>
+              <a:rPr lang="en-US" dirty="0" smtClean="0"/>
+              <a:t>API for common </a:t>
+            </a:r>
+            <a:r>
               <a:rPr lang="en-US" dirty="0"/>
-              <a:t>Framework </a:t>
+              <a:t>server actions </a:t>
             </a:r>
             <a:endParaRPr lang="en-US" dirty="0" smtClean="0"/>
+          </a:p>
+          <a:p>
+            <a:pPr marL="457200" indent="-457200" algn="l">
+              <a:buFont typeface="Arial"/>
+              <a:buChar char="•"/>
+            </a:pPr>
+            <a:r>
+              <a:rPr lang="en-US" dirty="0"/>
+              <a:t>Provide </a:t>
+            </a:r>
+            <a:r>
+              <a:rPr lang="en-US" dirty="0" smtClean="0"/>
+              <a:t>structure  for user </a:t>
+            </a:r>
+            <a:r>
+              <a:rPr lang="en-US" dirty="0" smtClean="0"/>
+              <a:t>code</a:t>
+            </a:r>
           </a:p>
           <a:p>
             <a:pPr marL="914400" lvl="1" indent="-457200" algn="l">
@@ -3479,13 +3492,12 @@
             </a:pPr>
             <a:r>
               <a:rPr lang="en-US" dirty="0" smtClean="0"/>
-              <a:t>API for common </a:t>
+              <a:t>Routing </a:t>
             </a:r>
             <a:r>
               <a:rPr lang="en-US" dirty="0"/>
-              <a:t>server actions </a:t>
-            </a:r>
-            <a:endParaRPr lang="en-US" dirty="0" smtClean="0"/>
+              <a:t>&amp; Views</a:t>
+            </a:r>
           </a:p>
           <a:p>
             <a:pPr marL="914400" lvl="1" indent="-457200" algn="l">
@@ -3494,15 +3506,7 @@
             </a:pPr>
             <a:r>
               <a:rPr lang="en-US" dirty="0"/>
-              <a:t>Provide </a:t>
-            </a:r>
-            <a:r>
-              <a:rPr lang="en-US" dirty="0" smtClean="0"/>
-              <a:t>structure  for user </a:t>
-            </a:r>
-            <a:r>
-              <a:rPr lang="en-US" dirty="0"/>
-              <a:t>code</a:t>
+              <a:t>Services</a:t>
             </a:r>
           </a:p>
           <a:p>
@@ -3510,90 +3514,7 @@
               <a:buFont typeface="Arial"/>
               <a:buChar char="•"/>
             </a:pPr>
-            <a:r>
-              <a:rPr lang="en-US" dirty="0"/>
-              <a:t>Common server actions</a:t>
-            </a:r>
-          </a:p>
-          <a:p>
-            <a:pPr marL="914400" lvl="1" indent="-457200" algn="l">
-              <a:buFont typeface="Arial"/>
-              <a:buChar char="•"/>
-            </a:pPr>
-            <a:r>
-              <a:rPr lang="en-US" dirty="0"/>
-              <a:t>Authentication</a:t>
-            </a:r>
-          </a:p>
-          <a:p>
-            <a:pPr marL="914400" lvl="1" indent="-457200" algn="l">
-              <a:buFont typeface="Arial"/>
-              <a:buChar char="•"/>
-            </a:pPr>
-            <a:r>
-              <a:rPr lang="en-US" dirty="0"/>
-              <a:t>Cookies</a:t>
-            </a:r>
-          </a:p>
-          <a:p>
-            <a:pPr marL="914400" lvl="1" indent="-457200" algn="l">
-              <a:buFont typeface="Arial"/>
-              <a:buChar char="•"/>
-            </a:pPr>
-            <a:r>
-              <a:rPr lang="en-US" dirty="0"/>
-              <a:t>Caching</a:t>
-            </a:r>
-          </a:p>
-          <a:p>
-            <a:pPr marL="914400" lvl="1" indent="-457200" algn="l">
-              <a:buFont typeface="Arial"/>
-              <a:buChar char="•"/>
-            </a:pPr>
-            <a:r>
-              <a:rPr lang="en-US" dirty="0"/>
-              <a:t>Logging</a:t>
-            </a:r>
-          </a:p>
-          <a:p>
-            <a:pPr marL="914400" lvl="1" indent="-457200" algn="l">
-              <a:buFont typeface="Arial"/>
-              <a:buChar char="•"/>
-            </a:pPr>
-            <a:r>
-              <a:rPr lang="en-US" dirty="0"/>
-              <a:t>Error handling</a:t>
-            </a:r>
-          </a:p>
-          <a:p>
-            <a:pPr marL="457200" indent="-457200" algn="l">
-              <a:buFont typeface="Arial"/>
-              <a:buChar char="•"/>
-            </a:pPr>
-            <a:r>
-              <a:rPr lang="en-US" dirty="0"/>
-              <a:t>User code</a:t>
-            </a:r>
-          </a:p>
-          <a:p>
-            <a:pPr marL="914400" lvl="1" indent="-457200" algn="l">
-              <a:buFont typeface="Arial"/>
-              <a:buChar char="•"/>
-            </a:pPr>
-            <a:r>
-              <a:rPr lang="en-US" dirty="0"/>
-              <a:t>Routing &amp; Views</a:t>
-            </a:r>
-          </a:p>
-          <a:p>
-            <a:pPr marL="914400" lvl="1" indent="-457200" algn="l">
-              <a:buFont typeface="Arial"/>
-              <a:buChar char="•"/>
-            </a:pPr>
-            <a:r>
-              <a:rPr lang="en-US" dirty="0"/>
-              <a:t>Services</a:t>
-            </a:r>
+            <a:endParaRPr lang="en-US" dirty="0"/>
           </a:p>
         </p:txBody>
       </p:sp>
@@ -3674,9 +3595,20 @@
         </p:spPr>
         <p:txBody>
           <a:bodyPr>
-            <a:normAutofit fontScale="92500" lnSpcReduction="10000"/>
+            <a:normAutofit/>
           </a:bodyPr>
           <a:lstStyle/>
+          <a:p>
+            <a:pPr algn="l"/>
+            <a:r>
+              <a:rPr lang="en-US" dirty="0" smtClean="0"/>
+              <a:t>Common </a:t>
+            </a:r>
+            <a:r>
+              <a:rPr lang="en-US" dirty="0"/>
+              <a:t>server actions</a:t>
+            </a:r>
+          </a:p>
           <a:p>
             <a:pPr marL="457200" indent="-457200" algn="l">
               <a:buFont typeface="Arial"/>
@@ -3684,7 +3616,7 @@
             </a:pPr>
             <a:r>
               <a:rPr lang="en-US" dirty="0"/>
-              <a:t>Middleware API</a:t>
+              <a:t>Authentication</a:t>
             </a:r>
           </a:p>
           <a:p>
@@ -3694,11 +3626,7 @@
             </a:pPr>
             <a:r>
               <a:rPr lang="en-US" dirty="0"/>
-              <a:t>Register one or more </a:t>
-            </a:r>
-            <a:r>
-              <a:rPr lang="en-US" dirty="0" smtClean="0"/>
-              <a:t>callbacks </a:t>
+              <a:t>Cookies</a:t>
             </a:r>
           </a:p>
           <a:p>
@@ -3707,12 +3635,8 @@
               <a:buChar char="•"/>
             </a:pPr>
             <a:r>
-              <a:rPr lang="en-US" dirty="0" smtClean="0"/>
-              <a:t>Callbacks </a:t>
-            </a:r>
-            <a:r>
               <a:rPr lang="en-US" dirty="0"/>
-              <a:t>get passed three arguments: request, response, next</a:t>
+              <a:t>Caching</a:t>
             </a:r>
           </a:p>
           <a:p>
@@ -3722,13 +3646,8 @@
             </a:pPr>
             <a:r>
               <a:rPr lang="en-US" dirty="0"/>
-              <a:t>'next' is a </a:t>
-            </a:r>
-            <a:r>
-              <a:rPr lang="en-US" dirty="0" smtClean="0"/>
-              <a:t>convention</a:t>
-            </a:r>
-            <a:endParaRPr lang="en-US" dirty="0"/>
+              <a:t>Logging</a:t>
+            </a:r>
           </a:p>
           <a:p>
             <a:pPr marL="457200" indent="-457200" algn="l">
@@ -3737,41 +3656,20 @@
             </a:pPr>
             <a:r>
               <a:rPr lang="en-US" dirty="0"/>
-              <a:t>Use it like 'return' to pass control to next function</a:t>
-            </a:r>
-          </a:p>
-          <a:p>
-            <a:pPr marL="457200" indent="-457200" algn="l">
-              <a:buFont typeface="Arial"/>
-              <a:buChar char="•"/>
-            </a:pPr>
-            <a:r>
-              <a:rPr lang="en-US" dirty="0"/>
-              <a:t>Or call next</a:t>
-            </a:r>
-            <a:r>
-              <a:rPr lang="en-US" dirty="0" smtClean="0"/>
-              <a:t>( '</a:t>
-            </a:r>
-            <a:r>
-              <a:rPr lang="en-US" dirty="0"/>
-              <a:t>route</a:t>
-            </a:r>
-            <a:r>
-              <a:rPr lang="en-US" dirty="0" smtClean="0"/>
-              <a:t>' ) </a:t>
-            </a:r>
-            <a:r>
-              <a:rPr lang="en-US" dirty="0"/>
-              <a:t>to skip remaining callbacks</a:t>
-            </a:r>
+              <a:t>Error </a:t>
+            </a:r>
+            <a:r>
+              <a:rPr lang="en-US" dirty="0" smtClean="0"/>
+              <a:t>handling</a:t>
+            </a:r>
+            <a:endParaRPr lang="en-US" dirty="0"/>
           </a:p>
         </p:txBody>
       </p:sp>
     </p:spTree>
     <p:extLst>
       <p:ext uri="{BB962C8B-B14F-4D97-AF65-F5344CB8AC3E}">
-        <p14:creationId xmlns:p14="http://schemas.microsoft.com/office/powerpoint/2010/main" val="902261728"/>
+        <p14:creationId xmlns:p14="http://schemas.microsoft.com/office/powerpoint/2010/main" val="1754653660"/>
       </p:ext>
     </p:extLst>
   </p:cSld>
@@ -3851,85 +3749,101 @@
           <a:p>
             <a:pPr algn="l"/>
             <a:r>
-              <a:rPr lang="en-US" dirty="0" err="1"/>
-              <a:t>app.all</a:t>
-            </a:r>
+              <a:rPr lang="en-US" dirty="0" smtClean="0"/>
+              <a:t>Routes </a:t>
+            </a:r>
+          </a:p>
+          <a:p>
+            <a:pPr marL="457200" indent="-457200" algn="l">
+              <a:buFont typeface="Arial"/>
+              <a:buChar char="•"/>
+            </a:pPr>
             <a:r>
               <a:rPr lang="en-US" dirty="0"/>
-              <a:t>('*', </a:t>
-            </a:r>
-            <a:r>
-              <a:rPr lang="en-US" dirty="0" err="1"/>
-              <a:t>requireAuthentication</a:t>
+              <a:t>match </a:t>
+            </a:r>
+            <a:r>
+              <a:rPr lang="en-US" dirty="0" smtClean="0"/>
+              <a:t>patterns</a:t>
             </a:r>
             <a:r>
               <a:rPr lang="en-US" dirty="0"/>
-              <a:t>, </a:t>
-            </a:r>
-            <a:r>
-              <a:rPr lang="en-US" dirty="0" err="1"/>
-              <a:t>loadUser</a:t>
+              <a:t> to</a:t>
+            </a:r>
+            <a:r>
+              <a:rPr lang="en-US" dirty="0" smtClean="0"/>
+              <a:t> callbacks</a:t>
+            </a:r>
+            <a:endParaRPr lang="en-US" dirty="0" smtClean="0"/>
+          </a:p>
+          <a:p>
+            <a:pPr marL="457200" indent="-457200" algn="l">
+              <a:buFont typeface="Arial"/>
+              <a:buChar char="•"/>
+            </a:pPr>
+            <a:r>
+              <a:rPr lang="en-US" dirty="0" smtClean="0"/>
+              <a:t>uses </a:t>
             </a:r>
             <a:r>
               <a:rPr lang="en-US" dirty="0"/>
-              <a:t>, </a:t>
-            </a:r>
-            <a:r>
-              <a:rPr lang="en-US" dirty="0" err="1"/>
-              <a:t>noOp</a:t>
-            </a:r>
-            <a:r>
-              <a:rPr lang="en-US" dirty="0"/>
-              <a:t>);</a:t>
-            </a:r>
-          </a:p>
-          <a:p>
-            <a:pPr algn="l"/>
-            <a:endParaRPr lang="en-US" dirty="0"/>
-          </a:p>
-          <a:p>
-            <a:pPr algn="l"/>
-            <a:r>
-              <a:rPr lang="en-US" dirty="0" smtClean="0"/>
-              <a:t>function </a:t>
-            </a:r>
-            <a:r>
-              <a:rPr lang="en-US" dirty="0" err="1"/>
-              <a:t>noOp</a:t>
-            </a:r>
-            <a:r>
-              <a:rPr lang="en-US" dirty="0"/>
-              <a:t> (</a:t>
-            </a:r>
-            <a:r>
-              <a:rPr lang="en-US" dirty="0" err="1"/>
-              <a:t>req</a:t>
-            </a:r>
-            <a:r>
-              <a:rPr lang="en-US" dirty="0"/>
-              <a:t>, res, next) {</a:t>
-            </a:r>
-          </a:p>
-          <a:p>
-            <a:pPr algn="l"/>
-            <a:r>
-              <a:rPr lang="en-US" dirty="0"/>
-              <a:t>  next();</a:t>
-            </a:r>
-          </a:p>
-          <a:p>
-            <a:pPr algn="l"/>
-            <a:r>
-              <a:rPr lang="en-US" dirty="0"/>
-              <a:t>}</a:t>
-            </a:r>
+              <a:t>path-to-</a:t>
+            </a:r>
+            <a:r>
+              <a:rPr lang="en-US" dirty="0" err="1" smtClean="0"/>
+              <a:t>regexp</a:t>
+            </a:r>
+            <a:endParaRPr lang="en-US" dirty="0" smtClean="0"/>
+          </a:p>
+          <a:p>
+            <a:pPr marL="914400" lvl="1" indent="-457200" algn="l">
+              <a:buFont typeface="Arial"/>
+              <a:buChar char="•"/>
+            </a:pPr>
+            <a:r>
+              <a:rPr lang="en-US" dirty="0" smtClean="0"/>
+              <a:t>Most operators available</a:t>
+            </a:r>
+          </a:p>
+          <a:p>
+            <a:pPr marL="914400" lvl="1" indent="-457200" algn="l">
+              <a:buFont typeface="Arial"/>
+              <a:buChar char="•"/>
+            </a:pPr>
+            <a:r>
+              <a:rPr lang="en-US" dirty="0" smtClean="0"/>
+              <a:t>- and . are taken literally</a:t>
+            </a:r>
+          </a:p>
+          <a:p>
+            <a:pPr marL="457200" indent="-457200" algn="l">
+              <a:buFont typeface="Arial"/>
+              <a:buChar char="•"/>
+            </a:pPr>
+            <a:r>
+              <a:rPr lang="en-US" dirty="0" smtClean="0"/>
+              <a:t>:</a:t>
+            </a:r>
+            <a:r>
+              <a:rPr lang="en-US" dirty="0" err="1" smtClean="0"/>
+              <a:t>varname</a:t>
+            </a:r>
+            <a:r>
+              <a:rPr lang="en-US" dirty="0" smtClean="0"/>
+              <a:t> creates </a:t>
+            </a:r>
+            <a:r>
+              <a:rPr lang="en-US" dirty="0" err="1" smtClean="0"/>
+              <a:t>param</a:t>
+            </a:r>
+            <a:endParaRPr lang="en-US" dirty="0" smtClean="0"/>
           </a:p>
         </p:txBody>
       </p:sp>
     </p:spTree>
     <p:extLst>
       <p:ext uri="{BB962C8B-B14F-4D97-AF65-F5344CB8AC3E}">
-        <p14:creationId xmlns:p14="http://schemas.microsoft.com/office/powerpoint/2010/main" val="3942464571"/>
+        <p14:creationId xmlns:p14="http://schemas.microsoft.com/office/powerpoint/2010/main" val="902261728"/>
       </p:ext>
     </p:extLst>
   </p:cSld>
@@ -4003,126 +3917,58 @@
         </p:spPr>
         <p:txBody>
           <a:bodyPr>
-            <a:normAutofit fontScale="85000" lnSpcReduction="20000"/>
+            <a:normAutofit/>
           </a:bodyPr>
           <a:lstStyle/>
           <a:p>
             <a:pPr algn="l"/>
             <a:r>
+              <a:rPr lang="en-US" dirty="0" smtClean="0"/>
+              <a:t>Callbacks get three </a:t>
+            </a:r>
+            <a:r>
               <a:rPr lang="en-US" dirty="0"/>
-              <a:t>A route matches a URL to an action</a:t>
-            </a:r>
-          </a:p>
-          <a:p>
-            <a:pPr algn="l"/>
+              <a:t>arguments: </a:t>
+            </a:r>
+            <a:endParaRPr lang="en-US" dirty="0" smtClean="0"/>
+          </a:p>
+          <a:p>
+            <a:pPr marL="914400" lvl="1" indent="-457200" algn="l">
+              <a:buFont typeface="Arial"/>
+              <a:buChar char="•"/>
+            </a:pPr>
+            <a:r>
+              <a:rPr lang="en-US" dirty="0" smtClean="0"/>
+              <a:t>request</a:t>
+            </a:r>
+          </a:p>
+          <a:p>
+            <a:pPr marL="914400" lvl="1" indent="-457200" algn="l">
+              <a:buFont typeface="Arial"/>
+              <a:buChar char="•"/>
+            </a:pPr>
+            <a:r>
+              <a:rPr lang="en-US" dirty="0" smtClean="0"/>
+              <a:t>response</a:t>
+            </a:r>
+          </a:p>
+          <a:p>
+            <a:pPr marL="914400" lvl="1" indent="-457200" algn="l">
+              <a:buFont typeface="Arial"/>
+              <a:buChar char="•"/>
+            </a:pPr>
+            <a:r>
+              <a:rPr lang="en-US" dirty="0" smtClean="0"/>
+              <a:t>next</a:t>
+            </a:r>
             <a:endParaRPr lang="en-US" dirty="0"/>
-          </a:p>
-          <a:p>
-            <a:pPr algn="l"/>
-            <a:r>
-              <a:rPr lang="en-US" dirty="0"/>
-              <a:t>// GET method route</a:t>
-            </a:r>
-          </a:p>
-          <a:p>
-            <a:pPr algn="l"/>
-            <a:r>
-              <a:rPr lang="en-US" dirty="0" err="1"/>
-              <a:t>app.get</a:t>
-            </a:r>
-            <a:r>
-              <a:rPr lang="en-US" dirty="0"/>
-              <a:t>('/', function (</a:t>
-            </a:r>
-            <a:r>
-              <a:rPr lang="en-US" dirty="0" err="1"/>
-              <a:t>req</a:t>
-            </a:r>
-            <a:r>
-              <a:rPr lang="en-US" dirty="0"/>
-              <a:t>, res) {</a:t>
-            </a:r>
-          </a:p>
-          <a:p>
-            <a:pPr algn="l"/>
-            <a:r>
-              <a:rPr lang="en-US" dirty="0"/>
-              <a:t>  </a:t>
-            </a:r>
-            <a:r>
-              <a:rPr lang="en-US" dirty="0" err="1"/>
-              <a:t>res.send</a:t>
-            </a:r>
-            <a:r>
-              <a:rPr lang="en-US" dirty="0"/>
-              <a:t>('GET request to the homepage');</a:t>
-            </a:r>
-          </a:p>
-          <a:p>
-            <a:pPr algn="l"/>
-            <a:r>
-              <a:rPr lang="en-US" dirty="0"/>
-              <a:t>});</a:t>
-            </a:r>
-          </a:p>
-          <a:p>
-            <a:pPr algn="l"/>
-            <a:endParaRPr lang="en-US" dirty="0"/>
-          </a:p>
-          <a:p>
-            <a:pPr algn="l"/>
-            <a:r>
-              <a:rPr lang="en-US" dirty="0"/>
-              <a:t>// POST method route</a:t>
-            </a:r>
-          </a:p>
-          <a:p>
-            <a:pPr algn="l"/>
-            <a:r>
-              <a:rPr lang="en-US" dirty="0" err="1"/>
-              <a:t>app.post</a:t>
-            </a:r>
-            <a:r>
-              <a:rPr lang="en-US" dirty="0"/>
-              <a:t>('/', function (</a:t>
-            </a:r>
-            <a:r>
-              <a:rPr lang="en-US" dirty="0" err="1"/>
-              <a:t>req</a:t>
-            </a:r>
-            <a:r>
-              <a:rPr lang="en-US" dirty="0"/>
-              <a:t>, res) {</a:t>
-            </a:r>
-          </a:p>
-          <a:p>
-            <a:pPr algn="l"/>
-            <a:r>
-              <a:rPr lang="en-US" dirty="0"/>
-              <a:t>  </a:t>
-            </a:r>
-            <a:r>
-              <a:rPr lang="en-US" dirty="0" err="1"/>
-              <a:t>res.send</a:t>
-            </a:r>
-            <a:r>
-              <a:rPr lang="en-US" dirty="0"/>
-              <a:t>('POST request to the homepage');</a:t>
-            </a:r>
-          </a:p>
-          <a:p>
-            <a:pPr algn="l"/>
-            <a:r>
-              <a:rPr lang="en-US" dirty="0"/>
-              <a:t>});</a:t>
-            </a:r>
           </a:p>
         </p:txBody>
       </p:sp>
     </p:spTree>
     <p:extLst>
       <p:ext uri="{BB962C8B-B14F-4D97-AF65-F5344CB8AC3E}">
-        <p14:creationId xmlns:p14="http://schemas.microsoft.com/office/powerpoint/2010/main" val="3204905909"/>
+        <p14:creationId xmlns:p14="http://schemas.microsoft.com/office/powerpoint/2010/main" val="696964488"/>
       </p:ext>
     </p:extLst>
   </p:cSld>
@@ -4171,8 +4017,8 @@
           <a:p>
             <a:pPr marL="457200" indent="-457200"/>
             <a:r>
-              <a:rPr lang="en-US" dirty="0"/>
-              <a:t>Lab: Set up Express</a:t>
+              <a:rPr lang="en-US" dirty="0" smtClean="0"/>
+              <a:t>Intro to Express</a:t>
             </a:r>
             <a:endParaRPr lang="en-US" dirty="0"/>
           </a:p>
@@ -4196,73 +4042,140 @@
         </p:spPr>
         <p:txBody>
           <a:bodyPr>
-            <a:normAutofit/>
+            <a:normAutofit lnSpcReduction="10000"/>
           </a:bodyPr>
           <a:lstStyle/>
           <a:p>
             <a:pPr algn="l"/>
             <a:r>
+              <a:rPr lang="en-US" dirty="0" smtClean="0"/>
+              <a:t>next === Middleware </a:t>
+            </a:r>
+            <a:r>
               <a:rPr lang="en-US" dirty="0"/>
-              <a:t> - Create server folder                                  </a:t>
-            </a:r>
-          </a:p>
-          <a:p>
-            <a:pPr algn="l"/>
+              <a:t>API</a:t>
+            </a:r>
+          </a:p>
+          <a:p>
+            <a:pPr marL="457200" indent="-457200" algn="l">
+              <a:buFont typeface="Arial"/>
+              <a:buChar char="•"/>
+            </a:pPr>
+            <a:r>
+              <a:rPr lang="en-US" dirty="0" smtClean="0"/>
+              <a:t>next() </a:t>
+            </a:r>
+          </a:p>
+          <a:p>
+            <a:pPr marL="914400" lvl="1" indent="-457200" algn="l">
+              <a:buFont typeface="Arial"/>
+              <a:buChar char="•"/>
+            </a:pPr>
+            <a:r>
+              <a:rPr lang="en-US" dirty="0" smtClean="0"/>
+              <a:t>pass </a:t>
+            </a:r>
             <a:r>
               <a:rPr lang="en-US" dirty="0"/>
-              <a:t> - </a:t>
-            </a:r>
-            <a:r>
-              <a:rPr lang="en-US" dirty="0" err="1"/>
-              <a:t>npm</a:t>
-            </a:r>
+              <a:t>control to next </a:t>
+            </a:r>
+            <a:r>
+              <a:rPr lang="en-US" dirty="0" smtClean="0"/>
+              <a:t>match</a:t>
+            </a:r>
+          </a:p>
+          <a:p>
+            <a:pPr marL="914400" lvl="1" indent="-457200" algn="l">
+              <a:buFont typeface="Arial"/>
+              <a:buChar char="•"/>
+            </a:pPr>
             <a:r>
               <a:rPr lang="en-US" dirty="0"/>
-              <a:t> install express</a:t>
-            </a:r>
-          </a:p>
-          <a:p>
-            <a:pPr algn="l"/>
+              <a:t>like 'return</a:t>
+            </a:r>
+            <a:r>
+              <a:rPr lang="en-US" dirty="0" smtClean="0"/>
+              <a:t>' keyword</a:t>
+            </a:r>
+          </a:p>
+          <a:p>
+            <a:pPr marL="457200" indent="-457200" algn="l">
+              <a:buFont typeface="Arial"/>
+              <a:buChar char="•"/>
+            </a:pPr>
+            <a:r>
+              <a:rPr lang="en-US" dirty="0" smtClean="0"/>
+              <a:t>next</a:t>
+            </a:r>
+            <a:r>
+              <a:rPr lang="en-US" dirty="0" smtClean="0"/>
+              <a:t>( '</a:t>
+            </a:r>
             <a:r>
               <a:rPr lang="en-US" dirty="0"/>
-              <a:t> - </a:t>
-            </a:r>
-            <a:r>
-              <a:rPr lang="en-US" dirty="0" err="1"/>
-              <a:t>Config</a:t>
+              <a:t>route</a:t>
+            </a:r>
+            <a:r>
+              <a:rPr lang="en-US" dirty="0" smtClean="0"/>
+              <a:t>' ) </a:t>
+            </a:r>
+            <a:endParaRPr lang="en-US" dirty="0" smtClean="0"/>
+          </a:p>
+          <a:p>
+            <a:pPr marL="914400" lvl="1" indent="-457200" algn="l">
+              <a:buFont typeface="Arial"/>
+              <a:buChar char="•"/>
+            </a:pPr>
+            <a:r>
+              <a:rPr lang="en-US" dirty="0" smtClean="0"/>
+              <a:t>Specifically the string 'route'</a:t>
+            </a:r>
+          </a:p>
+          <a:p>
+            <a:pPr marL="914400" lvl="1" indent="-457200" algn="l">
+              <a:buFont typeface="Arial"/>
+              <a:buChar char="•"/>
+            </a:pPr>
+            <a:r>
+              <a:rPr lang="en-US" dirty="0" smtClean="0"/>
+              <a:t>skips </a:t>
             </a:r>
             <a:r>
               <a:rPr lang="en-US" dirty="0"/>
-              <a:t> app()</a:t>
-            </a:r>
-          </a:p>
-          <a:p>
-            <a:pPr algn="l"/>
+              <a:t>remaining </a:t>
+            </a:r>
+            <a:r>
+              <a:rPr lang="en-US" dirty="0" smtClean="0"/>
+              <a:t>callbacks</a:t>
+            </a:r>
+          </a:p>
+          <a:p>
+            <a:pPr marL="457200" indent="-457200" algn="l">
+              <a:buFont typeface="Arial"/>
+              <a:buChar char="•"/>
+            </a:pPr>
             <a:r>
               <a:rPr lang="en-US" dirty="0"/>
-              <a:t> - pass business logic module attached to Request object</a:t>
-            </a:r>
-          </a:p>
-          <a:p>
-            <a:pPr algn="l"/>
-            <a:r>
-              <a:rPr lang="en-US" dirty="0"/>
-              <a:t> - Create some routes</a:t>
-            </a:r>
-          </a:p>
-          <a:p>
-            <a:pPr algn="l"/>
-            <a:r>
-              <a:rPr lang="en-US" dirty="0"/>
-              <a:t> - Map business logic</a:t>
-            </a:r>
+              <a:t>next( err ) </a:t>
+            </a:r>
+          </a:p>
+          <a:p>
+            <a:pPr marL="914400" lvl="1" indent="-457200" algn="l">
+              <a:buFont typeface="Arial"/>
+              <a:buChar char="•"/>
+            </a:pPr>
+            <a:r>
+              <a:rPr lang="en-US" dirty="0" smtClean="0"/>
+              <a:t>Any other value triggers error</a:t>
+            </a:r>
+            <a:endParaRPr lang="en-US" dirty="0"/>
           </a:p>
         </p:txBody>
       </p:sp>
     </p:spTree>
     <p:extLst>
       <p:ext uri="{BB962C8B-B14F-4D97-AF65-F5344CB8AC3E}">
-        <p14:creationId xmlns:p14="http://schemas.microsoft.com/office/powerpoint/2010/main" val="1644035249"/>
+        <p14:creationId xmlns:p14="http://schemas.microsoft.com/office/powerpoint/2010/main" val="177685004"/>
       </p:ext>
     </p:extLst>
   </p:cSld>

</xml_diff>